<commit_message>
MAJ diagramme de séquence et BDD
</commit_message>
<xml_diff>
--- a/Cyril/Diapositives/Projet Théléton.pptx
+++ b/Cyril/Diapositives/Projet Théléton.pptx
@@ -5,7 +5,7 @@
     <p:sldMasterId id="2147483660" r:id="rId1"/>
   </p:sldMasterIdLst>
   <p:notesMasterIdLst>
-    <p:notesMasterId r:id="rId13"/>
+    <p:notesMasterId r:id="rId14"/>
   </p:notesMasterIdLst>
   <p:sldIdLst>
     <p:sldId id="266" r:id="rId2"/>
@@ -13,12 +13,13 @@
     <p:sldId id="269" r:id="rId4"/>
     <p:sldId id="258" r:id="rId5"/>
     <p:sldId id="259" r:id="rId6"/>
-    <p:sldId id="271" r:id="rId7"/>
-    <p:sldId id="263" r:id="rId8"/>
-    <p:sldId id="264" r:id="rId9"/>
-    <p:sldId id="265" r:id="rId10"/>
-    <p:sldId id="273" r:id="rId11"/>
-    <p:sldId id="268" r:id="rId12"/>
+    <p:sldId id="274" r:id="rId7"/>
+    <p:sldId id="271" r:id="rId8"/>
+    <p:sldId id="263" r:id="rId9"/>
+    <p:sldId id="264" r:id="rId10"/>
+    <p:sldId id="265" r:id="rId11"/>
+    <p:sldId id="273" r:id="rId12"/>
+    <p:sldId id="268" r:id="rId13"/>
   </p:sldIdLst>
   <p:sldSz cx="12192000" cy="6858000"/>
   <p:notesSz cx="6858000" cy="9144000"/>
@@ -626,7 +627,7 @@
           <a:p>
             <a:fld id="{0EE03F40-5359-45BD-BFB3-41D3E922B839}" type="slidenum">
               <a:rPr lang="fr-FR" smtClean="0"/>
-              <a:t>7</a:t>
+              <a:t>8</a:t>
             </a:fld>
             <a:endParaRPr lang="fr-FR"/>
           </a:p>
@@ -710,7 +711,7 @@
           <a:p>
             <a:fld id="{0EE03F40-5359-45BD-BFB3-41D3E922B839}" type="slidenum">
               <a:rPr lang="fr-FR" smtClean="0"/>
-              <a:t>11</a:t>
+              <a:t>12</a:t>
             </a:fld>
             <a:endParaRPr lang="fr-FR"/>
           </a:p>
@@ -7941,6 +7942,717 @@
           <p:cNvPr id="2" name="Titre 1">
             <a:extLst>
               <a:ext uri="{FF2B5EF4-FFF2-40B4-BE49-F238E27FC236}">
+                <a16:creationId xmlns:a16="http://schemas.microsoft.com/office/drawing/2014/main" id="{C08AD442-B16F-476B-9790-6E67B56D2E21}"/>
+              </a:ext>
+            </a:extLst>
+          </p:cNvPr>
+          <p:cNvSpPr>
+            <a:spLocks noGrp="1"/>
+          </p:cNvSpPr>
+          <p:nvPr>
+            <p:ph type="title"/>
+          </p:nvPr>
+        </p:nvSpPr>
+        <p:spPr>
+          <a:xfrm>
+            <a:off x="367304" y="799292"/>
+            <a:ext cx="4890164" cy="728546"/>
+          </a:xfrm>
+        </p:spPr>
+        <p:txBody>
+          <a:bodyPr>
+            <a:normAutofit fontScale="90000"/>
+          </a:bodyPr>
+          <a:lstStyle/>
+          <a:p>
+            <a:r>
+              <a:rPr lang="fr-FR" dirty="0"/>
+              <a:t>Connexion de l’afficheur </a:t>
+            </a:r>
+            <a:br>
+              <a:rPr lang="fr-FR" dirty="0"/>
+            </a:br>
+            <a:endParaRPr lang="fr-FR" dirty="0"/>
+          </a:p>
+        </p:txBody>
+      </p:sp>
+      <p:sp>
+        <p:nvSpPr>
+          <p:cNvPr id="4" name="Espace réservé du contenu 2">
+            <a:extLst>
+              <a:ext uri="{FF2B5EF4-FFF2-40B4-BE49-F238E27FC236}">
+                <a16:creationId xmlns:a16="http://schemas.microsoft.com/office/drawing/2014/main" id="{9851E94F-E7E0-4881-A550-675FD40C88F1}"/>
+              </a:ext>
+            </a:extLst>
+          </p:cNvPr>
+          <p:cNvSpPr txBox="1">
+            <a:spLocks noGrp="1"/>
+          </p:cNvSpPr>
+          <p:nvPr>
+            <p:ph idx="1"/>
+          </p:nvPr>
+        </p:nvSpPr>
+        <p:spPr>
+          <a:xfrm>
+            <a:off x="440119" y="1730820"/>
+            <a:ext cx="4890164" cy="4404804"/>
+          </a:xfrm>
+          <a:prstGeom prst="rect">
+            <a:avLst/>
+          </a:prstGeom>
+        </p:spPr>
+        <p:txBody>
+          <a:bodyPr vert="horz" lIns="91440" tIns="45720" rIns="91440" bIns="45720" rtlCol="0">
+            <a:normAutofit/>
+          </a:bodyPr>
+          <a:lstStyle>
+            <a:lvl1pPr marL="228600" indent="-228600" algn="l" defTabSz="914400" rtl="0" eaLnBrk="1" latinLnBrk="0" hangingPunct="1">
+              <a:lnSpc>
+                <a:spcPct val="90000"/>
+              </a:lnSpc>
+              <a:spcBef>
+                <a:spcPts val="1000"/>
+              </a:spcBef>
+              <a:buFont typeface="Arial" panose="020B0604020202020204" pitchFamily="34" charset="0"/>
+              <a:buChar char="•"/>
+              <a:defRPr sz="2800" kern="1200">
+                <a:solidFill>
+                  <a:schemeClr val="tx1"/>
+                </a:solidFill>
+                <a:latin typeface="+mn-lt"/>
+                <a:ea typeface="+mn-ea"/>
+                <a:cs typeface="+mn-cs"/>
+              </a:defRPr>
+            </a:lvl1pPr>
+            <a:lvl2pPr marL="685800" indent="-228600" algn="l" defTabSz="914400" rtl="0" eaLnBrk="1" latinLnBrk="0" hangingPunct="1">
+              <a:lnSpc>
+                <a:spcPct val="90000"/>
+              </a:lnSpc>
+              <a:spcBef>
+                <a:spcPts val="500"/>
+              </a:spcBef>
+              <a:buFont typeface="Arial" panose="020B0604020202020204" pitchFamily="34" charset="0"/>
+              <a:buChar char="•"/>
+              <a:defRPr sz="2400" kern="1200">
+                <a:solidFill>
+                  <a:schemeClr val="tx1"/>
+                </a:solidFill>
+                <a:latin typeface="+mn-lt"/>
+                <a:ea typeface="+mn-ea"/>
+                <a:cs typeface="+mn-cs"/>
+              </a:defRPr>
+            </a:lvl2pPr>
+            <a:lvl3pPr marL="1143000" indent="-228600" algn="l" defTabSz="914400" rtl="0" eaLnBrk="1" latinLnBrk="0" hangingPunct="1">
+              <a:lnSpc>
+                <a:spcPct val="90000"/>
+              </a:lnSpc>
+              <a:spcBef>
+                <a:spcPts val="500"/>
+              </a:spcBef>
+              <a:buFont typeface="Arial" panose="020B0604020202020204" pitchFamily="34" charset="0"/>
+              <a:buChar char="•"/>
+              <a:defRPr sz="2000" kern="1200">
+                <a:solidFill>
+                  <a:schemeClr val="tx1"/>
+                </a:solidFill>
+                <a:latin typeface="+mn-lt"/>
+                <a:ea typeface="+mn-ea"/>
+                <a:cs typeface="+mn-cs"/>
+              </a:defRPr>
+            </a:lvl3pPr>
+            <a:lvl4pPr marL="1600200" indent="-228600" algn="l" defTabSz="914400" rtl="0" eaLnBrk="1" latinLnBrk="0" hangingPunct="1">
+              <a:lnSpc>
+                <a:spcPct val="90000"/>
+              </a:lnSpc>
+              <a:spcBef>
+                <a:spcPts val="500"/>
+              </a:spcBef>
+              <a:buFont typeface="Arial" panose="020B0604020202020204" pitchFamily="34" charset="0"/>
+              <a:buChar char="•"/>
+              <a:defRPr sz="1800" kern="1200">
+                <a:solidFill>
+                  <a:schemeClr val="tx1"/>
+                </a:solidFill>
+                <a:latin typeface="+mn-lt"/>
+                <a:ea typeface="+mn-ea"/>
+                <a:cs typeface="+mn-cs"/>
+              </a:defRPr>
+            </a:lvl4pPr>
+            <a:lvl5pPr marL="2057400" indent="-228600" algn="l" defTabSz="914400" rtl="0" eaLnBrk="1" latinLnBrk="0" hangingPunct="1">
+              <a:lnSpc>
+                <a:spcPct val="90000"/>
+              </a:lnSpc>
+              <a:spcBef>
+                <a:spcPts val="500"/>
+              </a:spcBef>
+              <a:buFont typeface="Arial" panose="020B0604020202020204" pitchFamily="34" charset="0"/>
+              <a:buChar char="•"/>
+              <a:defRPr sz="1800" kern="1200">
+                <a:solidFill>
+                  <a:schemeClr val="tx1"/>
+                </a:solidFill>
+                <a:latin typeface="+mn-lt"/>
+                <a:ea typeface="+mn-ea"/>
+                <a:cs typeface="+mn-cs"/>
+              </a:defRPr>
+            </a:lvl5pPr>
+            <a:lvl6pPr marL="2514600" indent="-228600" algn="l" defTabSz="914400" rtl="0" eaLnBrk="1" latinLnBrk="0" hangingPunct="1">
+              <a:lnSpc>
+                <a:spcPct val="90000"/>
+              </a:lnSpc>
+              <a:spcBef>
+                <a:spcPts val="500"/>
+              </a:spcBef>
+              <a:buFont typeface="Arial" panose="020B0604020202020204" pitchFamily="34" charset="0"/>
+              <a:buChar char="•"/>
+              <a:defRPr sz="1800" kern="1200">
+                <a:solidFill>
+                  <a:schemeClr val="tx1"/>
+                </a:solidFill>
+                <a:latin typeface="+mn-lt"/>
+                <a:ea typeface="+mn-ea"/>
+                <a:cs typeface="+mn-cs"/>
+              </a:defRPr>
+            </a:lvl6pPr>
+            <a:lvl7pPr marL="2971800" indent="-228600" algn="l" defTabSz="914400" rtl="0" eaLnBrk="1" latinLnBrk="0" hangingPunct="1">
+              <a:lnSpc>
+                <a:spcPct val="90000"/>
+              </a:lnSpc>
+              <a:spcBef>
+                <a:spcPts val="500"/>
+              </a:spcBef>
+              <a:buFont typeface="Arial" panose="020B0604020202020204" pitchFamily="34" charset="0"/>
+              <a:buChar char="•"/>
+              <a:defRPr sz="1800" kern="1200">
+                <a:solidFill>
+                  <a:schemeClr val="tx1"/>
+                </a:solidFill>
+                <a:latin typeface="+mn-lt"/>
+                <a:ea typeface="+mn-ea"/>
+                <a:cs typeface="+mn-cs"/>
+              </a:defRPr>
+            </a:lvl7pPr>
+            <a:lvl8pPr marL="3429000" indent="-228600" algn="l" defTabSz="914400" rtl="0" eaLnBrk="1" latinLnBrk="0" hangingPunct="1">
+              <a:lnSpc>
+                <a:spcPct val="90000"/>
+              </a:lnSpc>
+              <a:spcBef>
+                <a:spcPts val="500"/>
+              </a:spcBef>
+              <a:buFont typeface="Arial" panose="020B0604020202020204" pitchFamily="34" charset="0"/>
+              <a:buChar char="•"/>
+              <a:defRPr sz="1800" kern="1200">
+                <a:solidFill>
+                  <a:schemeClr val="tx1"/>
+                </a:solidFill>
+                <a:latin typeface="+mn-lt"/>
+                <a:ea typeface="+mn-ea"/>
+                <a:cs typeface="+mn-cs"/>
+              </a:defRPr>
+            </a:lvl8pPr>
+            <a:lvl9pPr marL="3886200" indent="-228600" algn="l" defTabSz="914400" rtl="0" eaLnBrk="1" latinLnBrk="0" hangingPunct="1">
+              <a:lnSpc>
+                <a:spcPct val="90000"/>
+              </a:lnSpc>
+              <a:spcBef>
+                <a:spcPts val="500"/>
+              </a:spcBef>
+              <a:buFont typeface="Arial" panose="020B0604020202020204" pitchFamily="34" charset="0"/>
+              <a:buChar char="•"/>
+              <a:defRPr sz="1800" kern="1200">
+                <a:solidFill>
+                  <a:schemeClr val="tx1"/>
+                </a:solidFill>
+                <a:latin typeface="+mn-lt"/>
+                <a:ea typeface="+mn-ea"/>
+                <a:cs typeface="+mn-cs"/>
+              </a:defRPr>
+            </a:lvl9pPr>
+          </a:lstStyle>
+          <a:p>
+            <a:pPr>
+              <a:buClr>
+                <a:schemeClr val="accent4"/>
+              </a:buClr>
+              <a:buFont typeface="Wingdings" panose="05000000000000000000" pitchFamily="2" charset="2"/>
+              <a:buChar char="Ø"/>
+            </a:pPr>
+            <a:r>
+              <a:rPr lang="fr-FR" sz="1800" dirty="0"/>
+              <a:t>Connecter Ecran LCD</a:t>
+            </a:r>
+          </a:p>
+          <a:p>
+            <a:endParaRPr lang="fr-FR" dirty="0"/>
+          </a:p>
+          <a:p>
+            <a:endParaRPr lang="fr-FR" dirty="0"/>
+          </a:p>
+          <a:p>
+            <a:endParaRPr lang="fr-FR" dirty="0"/>
+          </a:p>
+          <a:p>
+            <a:endParaRPr lang="fr-FR" dirty="0"/>
+          </a:p>
+          <a:p>
+            <a:endParaRPr lang="fr-FR" dirty="0"/>
+          </a:p>
+          <a:p>
+            <a:pPr marL="0" indent="0">
+              <a:buNone/>
+            </a:pPr>
+            <a:endParaRPr lang="fr-FR" dirty="0"/>
+          </a:p>
+          <a:p>
+            <a:pPr>
+              <a:buClr>
+                <a:schemeClr val="accent4"/>
+              </a:buClr>
+              <a:buFont typeface="Wingdings" panose="05000000000000000000" pitchFamily="2" charset="2"/>
+              <a:buChar char="Ø"/>
+            </a:pPr>
+            <a:r>
+              <a:rPr lang="fr-FR" sz="1800" dirty="0"/>
+              <a:t>Affichage de l’énigme sur l’</a:t>
+            </a:r>
+            <a:r>
+              <a:rPr lang="fr-FR" sz="1800" dirty="0" err="1"/>
+              <a:t>ecran</a:t>
+            </a:r>
+            <a:r>
+              <a:rPr lang="fr-FR" sz="1800" dirty="0"/>
+              <a:t> quand le code est bon</a:t>
+            </a:r>
+          </a:p>
+          <a:p>
+            <a:endParaRPr lang="fr-FR" dirty="0"/>
+          </a:p>
+        </p:txBody>
+      </p:sp>
+      <p:sp>
+        <p:nvSpPr>
+          <p:cNvPr id="5" name="Espace réservé du contenu 2">
+            <a:extLst>
+              <a:ext uri="{FF2B5EF4-FFF2-40B4-BE49-F238E27FC236}">
+                <a16:creationId xmlns:a16="http://schemas.microsoft.com/office/drawing/2014/main" id="{4EA4B949-06FA-4096-83AB-E011A5F55242}"/>
+              </a:ext>
+            </a:extLst>
+          </p:cNvPr>
+          <p:cNvSpPr txBox="1">
+            <a:spLocks/>
+          </p:cNvSpPr>
+          <p:nvPr/>
+        </p:nvSpPr>
+        <p:spPr>
+          <a:xfrm>
+            <a:off x="5499627" y="1703834"/>
+            <a:ext cx="5257800" cy="4351338"/>
+          </a:xfrm>
+          <a:prstGeom prst="rect">
+            <a:avLst/>
+          </a:prstGeom>
+        </p:spPr>
+        <p:txBody>
+          <a:bodyPr vert="horz" lIns="91440" tIns="45720" rIns="91440" bIns="45720" rtlCol="0">
+            <a:normAutofit/>
+          </a:bodyPr>
+          <a:lstStyle>
+            <a:lvl1pPr marL="342900" indent="-342900" algn="l" defTabSz="457200" rtl="0" eaLnBrk="1" latinLnBrk="0" hangingPunct="1">
+              <a:spcBef>
+                <a:spcPts val="1000"/>
+              </a:spcBef>
+              <a:spcAft>
+                <a:spcPts val="0"/>
+              </a:spcAft>
+              <a:buClr>
+                <a:schemeClr val="accent1"/>
+              </a:buClr>
+              <a:buSzPct val="80000"/>
+              <a:buFont typeface="Wingdings 3" charset="2"/>
+              <a:buChar char=""/>
+              <a:defRPr sz="1800" kern="1200">
+                <a:solidFill>
+                  <a:schemeClr val="tx1">
+                    <a:lumMod val="75000"/>
+                    <a:lumOff val="25000"/>
+                  </a:schemeClr>
+                </a:solidFill>
+                <a:latin typeface="+mn-lt"/>
+                <a:ea typeface="+mn-ea"/>
+                <a:cs typeface="+mn-cs"/>
+              </a:defRPr>
+            </a:lvl1pPr>
+            <a:lvl2pPr marL="742950" indent="-285750" algn="l" defTabSz="457200" rtl="0" eaLnBrk="1" latinLnBrk="0" hangingPunct="1">
+              <a:spcBef>
+                <a:spcPts val="1000"/>
+              </a:spcBef>
+              <a:spcAft>
+                <a:spcPts val="0"/>
+              </a:spcAft>
+              <a:buClr>
+                <a:schemeClr val="accent1"/>
+              </a:buClr>
+              <a:buSzPct val="80000"/>
+              <a:buFont typeface="Wingdings 3" charset="2"/>
+              <a:buChar char=""/>
+              <a:defRPr sz="1600" kern="1200">
+                <a:solidFill>
+                  <a:schemeClr val="tx1">
+                    <a:lumMod val="75000"/>
+                    <a:lumOff val="25000"/>
+                  </a:schemeClr>
+                </a:solidFill>
+                <a:latin typeface="+mn-lt"/>
+                <a:ea typeface="+mn-ea"/>
+                <a:cs typeface="+mn-cs"/>
+              </a:defRPr>
+            </a:lvl2pPr>
+            <a:lvl3pPr marL="1143000" indent="-228600" algn="l" defTabSz="457200" rtl="0" eaLnBrk="1" latinLnBrk="0" hangingPunct="1">
+              <a:spcBef>
+                <a:spcPts val="1000"/>
+              </a:spcBef>
+              <a:spcAft>
+                <a:spcPts val="0"/>
+              </a:spcAft>
+              <a:buClr>
+                <a:schemeClr val="accent1"/>
+              </a:buClr>
+              <a:buSzPct val="80000"/>
+              <a:buFont typeface="Wingdings 3" charset="2"/>
+              <a:buChar char=""/>
+              <a:defRPr sz="1400" kern="1200">
+                <a:solidFill>
+                  <a:schemeClr val="tx1">
+                    <a:lumMod val="75000"/>
+                    <a:lumOff val="25000"/>
+                  </a:schemeClr>
+                </a:solidFill>
+                <a:latin typeface="+mn-lt"/>
+                <a:ea typeface="+mn-ea"/>
+                <a:cs typeface="+mn-cs"/>
+              </a:defRPr>
+            </a:lvl3pPr>
+            <a:lvl4pPr marL="1600200" indent="-228600" algn="l" defTabSz="457200" rtl="0" eaLnBrk="1" latinLnBrk="0" hangingPunct="1">
+              <a:spcBef>
+                <a:spcPts val="1000"/>
+              </a:spcBef>
+              <a:spcAft>
+                <a:spcPts val="0"/>
+              </a:spcAft>
+              <a:buClr>
+                <a:schemeClr val="accent1"/>
+              </a:buClr>
+              <a:buSzPct val="80000"/>
+              <a:buFont typeface="Wingdings 3" charset="2"/>
+              <a:buChar char=""/>
+              <a:defRPr sz="1200" kern="1200">
+                <a:solidFill>
+                  <a:schemeClr val="tx1">
+                    <a:lumMod val="75000"/>
+                    <a:lumOff val="25000"/>
+                  </a:schemeClr>
+                </a:solidFill>
+                <a:latin typeface="+mn-lt"/>
+                <a:ea typeface="+mn-ea"/>
+                <a:cs typeface="+mn-cs"/>
+              </a:defRPr>
+            </a:lvl4pPr>
+            <a:lvl5pPr marL="2057400" indent="-228600" algn="l" defTabSz="457200" rtl="0" eaLnBrk="1" latinLnBrk="0" hangingPunct="1">
+              <a:spcBef>
+                <a:spcPts val="1000"/>
+              </a:spcBef>
+              <a:spcAft>
+                <a:spcPts val="0"/>
+              </a:spcAft>
+              <a:buClr>
+                <a:schemeClr val="accent1"/>
+              </a:buClr>
+              <a:buSzPct val="80000"/>
+              <a:buFont typeface="Wingdings 3" charset="2"/>
+              <a:buChar char=""/>
+              <a:defRPr sz="1200" kern="1200">
+                <a:solidFill>
+                  <a:schemeClr val="tx1">
+                    <a:lumMod val="75000"/>
+                    <a:lumOff val="25000"/>
+                  </a:schemeClr>
+                </a:solidFill>
+                <a:latin typeface="+mn-lt"/>
+                <a:ea typeface="+mn-ea"/>
+                <a:cs typeface="+mn-cs"/>
+              </a:defRPr>
+            </a:lvl5pPr>
+            <a:lvl6pPr marL="2514600" indent="-228600" algn="l" defTabSz="457200" rtl="0" eaLnBrk="1" latinLnBrk="0" hangingPunct="1">
+              <a:spcBef>
+                <a:spcPts val="1000"/>
+              </a:spcBef>
+              <a:spcAft>
+                <a:spcPts val="0"/>
+              </a:spcAft>
+              <a:buClr>
+                <a:schemeClr val="accent1"/>
+              </a:buClr>
+              <a:buSzPct val="80000"/>
+              <a:buFont typeface="Wingdings 3" charset="2"/>
+              <a:buChar char=""/>
+              <a:defRPr sz="1200" kern="1200">
+                <a:solidFill>
+                  <a:schemeClr val="tx1">
+                    <a:lumMod val="75000"/>
+                    <a:lumOff val="25000"/>
+                  </a:schemeClr>
+                </a:solidFill>
+                <a:latin typeface="+mn-lt"/>
+                <a:ea typeface="+mn-ea"/>
+                <a:cs typeface="+mn-cs"/>
+              </a:defRPr>
+            </a:lvl6pPr>
+            <a:lvl7pPr marL="2971800" indent="-228600" algn="l" defTabSz="457200" rtl="0" eaLnBrk="1" latinLnBrk="0" hangingPunct="1">
+              <a:spcBef>
+                <a:spcPts val="1000"/>
+              </a:spcBef>
+              <a:spcAft>
+                <a:spcPts val="0"/>
+              </a:spcAft>
+              <a:buClr>
+                <a:schemeClr val="accent1"/>
+              </a:buClr>
+              <a:buSzPct val="80000"/>
+              <a:buFont typeface="Wingdings 3" charset="2"/>
+              <a:buChar char=""/>
+              <a:defRPr sz="1200" kern="1200">
+                <a:solidFill>
+                  <a:schemeClr val="tx1">
+                    <a:lumMod val="75000"/>
+                    <a:lumOff val="25000"/>
+                  </a:schemeClr>
+                </a:solidFill>
+                <a:latin typeface="+mn-lt"/>
+                <a:ea typeface="+mn-ea"/>
+                <a:cs typeface="+mn-cs"/>
+              </a:defRPr>
+            </a:lvl7pPr>
+            <a:lvl8pPr marL="3429000" indent="-228600" algn="l" defTabSz="457200" rtl="0" eaLnBrk="1" latinLnBrk="0" hangingPunct="1">
+              <a:spcBef>
+                <a:spcPts val="1000"/>
+              </a:spcBef>
+              <a:spcAft>
+                <a:spcPts val="0"/>
+              </a:spcAft>
+              <a:buClr>
+                <a:schemeClr val="accent1"/>
+              </a:buClr>
+              <a:buSzPct val="80000"/>
+              <a:buFont typeface="Wingdings 3" charset="2"/>
+              <a:buChar char=""/>
+              <a:defRPr sz="1200" kern="1200">
+                <a:solidFill>
+                  <a:schemeClr val="tx1">
+                    <a:lumMod val="75000"/>
+                    <a:lumOff val="25000"/>
+                  </a:schemeClr>
+                </a:solidFill>
+                <a:latin typeface="+mn-lt"/>
+                <a:ea typeface="+mn-ea"/>
+                <a:cs typeface="+mn-cs"/>
+              </a:defRPr>
+            </a:lvl8pPr>
+            <a:lvl9pPr marL="3886200" indent="-228600" algn="l" defTabSz="457200" rtl="0" eaLnBrk="1" latinLnBrk="0" hangingPunct="1">
+              <a:spcBef>
+                <a:spcPts val="1000"/>
+              </a:spcBef>
+              <a:spcAft>
+                <a:spcPts val="0"/>
+              </a:spcAft>
+              <a:buClr>
+                <a:schemeClr val="accent1"/>
+              </a:buClr>
+              <a:buSzPct val="80000"/>
+              <a:buFont typeface="Wingdings 3" charset="2"/>
+              <a:buChar char=""/>
+              <a:defRPr sz="1200" kern="1200">
+                <a:solidFill>
+                  <a:schemeClr val="tx1">
+                    <a:lumMod val="75000"/>
+                    <a:lumOff val="25000"/>
+                  </a:schemeClr>
+                </a:solidFill>
+                <a:latin typeface="+mn-lt"/>
+                <a:ea typeface="+mn-ea"/>
+                <a:cs typeface="+mn-cs"/>
+              </a:defRPr>
+            </a:lvl9pPr>
+          </a:lstStyle>
+          <a:p>
+            <a:pPr>
+              <a:buClr>
+                <a:schemeClr val="accent4"/>
+              </a:buClr>
+              <a:buFont typeface="Wingdings" panose="05000000000000000000" pitchFamily="2" charset="2"/>
+              <a:buChar char="Ø"/>
+            </a:pPr>
+            <a:r>
+              <a:rPr lang="fr-FR" dirty="0"/>
+              <a:t>Code de connexion avec librairie "</a:t>
+            </a:r>
+            <a:r>
+              <a:rPr lang="fr-FR" dirty="0" err="1"/>
+              <a:t>LiquidCrystal.h</a:t>
+            </a:r>
+            <a:r>
+              <a:rPr lang="fr-FR" dirty="0"/>
+              <a:t>"  </a:t>
+            </a:r>
+          </a:p>
+          <a:p>
+            <a:endParaRPr lang="fr-FR" dirty="0"/>
+          </a:p>
+        </p:txBody>
+      </p:sp>
+      <p:pic>
+        <p:nvPicPr>
+          <p:cNvPr id="6" name="Image 5">
+            <a:extLst>
+              <a:ext uri="{FF2B5EF4-FFF2-40B4-BE49-F238E27FC236}">
+                <a16:creationId xmlns:a16="http://schemas.microsoft.com/office/drawing/2014/main" id="{347D77F9-F00E-4AF1-BE02-1057BAD09A07}"/>
+              </a:ext>
+            </a:extLst>
+          </p:cNvPr>
+          <p:cNvPicPr>
+            <a:picLocks noChangeAspect="1"/>
+          </p:cNvPicPr>
+          <p:nvPr/>
+        </p:nvPicPr>
+        <p:blipFill>
+          <a:blip r:embed="rId2"/>
+          <a:stretch>
+            <a:fillRect/>
+          </a:stretch>
+        </p:blipFill>
+        <p:spPr>
+          <a:xfrm>
+            <a:off x="5226968" y="2568147"/>
+            <a:ext cx="4401664" cy="2461053"/>
+          </a:xfrm>
+          <a:prstGeom prst="rect">
+            <a:avLst/>
+          </a:prstGeom>
+        </p:spPr>
+      </p:pic>
+      <p:pic>
+        <p:nvPicPr>
+          <p:cNvPr id="7" name="Image 6">
+            <a:extLst>
+              <a:ext uri="{FF2B5EF4-FFF2-40B4-BE49-F238E27FC236}">
+                <a16:creationId xmlns:a16="http://schemas.microsoft.com/office/drawing/2014/main" id="{1459C5C6-CB41-4C0D-8DFB-05145DEC6DD6}"/>
+              </a:ext>
+            </a:extLst>
+          </p:cNvPr>
+          <p:cNvPicPr/>
+          <p:nvPr/>
+        </p:nvPicPr>
+        <p:blipFill>
+          <a:blip r:embed="rId3">
+            <a:extLst>
+              <a:ext uri="{28A0092B-C50C-407E-A947-70E740481C1C}">
+                <a14:useLocalDpi xmlns:a14="http://schemas.microsoft.com/office/drawing/2010/main" val="0"/>
+              </a:ext>
+            </a:extLst>
+          </a:blip>
+          <a:stretch>
+            <a:fillRect/>
+          </a:stretch>
+        </p:blipFill>
+        <p:spPr>
+          <a:xfrm>
+            <a:off x="392430" y="2235169"/>
+            <a:ext cx="4133850" cy="2186940"/>
+          </a:xfrm>
+          <a:prstGeom prst="rect">
+            <a:avLst/>
+          </a:prstGeom>
+        </p:spPr>
+      </p:pic>
+      <p:pic>
+        <p:nvPicPr>
+          <p:cNvPr id="8" name="Picture 2" descr="Image associée">
+            <a:extLst>
+              <a:ext uri="{FF2B5EF4-FFF2-40B4-BE49-F238E27FC236}">
+                <a16:creationId xmlns:a16="http://schemas.microsoft.com/office/drawing/2014/main" id="{1D2A2ED6-3334-446B-B7F9-4AEDA8226A7B}"/>
+              </a:ext>
+            </a:extLst>
+          </p:cNvPr>
+          <p:cNvPicPr>
+            <a:picLocks noChangeAspect="1" noChangeArrowheads="1"/>
+          </p:cNvPicPr>
+          <p:nvPr/>
+        </p:nvPicPr>
+        <p:blipFill rotWithShape="1">
+          <a:blip r:embed="rId4">
+            <a:extLst>
+              <a:ext uri="{28A0092B-C50C-407E-A947-70E740481C1C}">
+                <a14:useLocalDpi xmlns:a14="http://schemas.microsoft.com/office/drawing/2010/main" val="0"/>
+              </a:ext>
+            </a:extLst>
+          </a:blip>
+          <a:srcRect l="18677" r="15441"/>
+          <a:stretch/>
+        </p:blipFill>
+        <p:spPr bwMode="auto">
+          <a:xfrm>
+            <a:off x="143436" y="143435"/>
+            <a:ext cx="2269635" cy="609600"/>
+          </a:xfrm>
+          <a:prstGeom prst="rect">
+            <a:avLst/>
+          </a:prstGeom>
+          <a:noFill/>
+          <a:extLst>
+            <a:ext uri="{909E8E84-426E-40DD-AFC4-6F175D3DCCD1}">
+              <a14:hiddenFill xmlns:a14="http://schemas.microsoft.com/office/drawing/2010/main">
+                <a:solidFill>
+                  <a:srgbClr val="FFFFFF"/>
+                </a:solidFill>
+              </a14:hiddenFill>
+            </a:ext>
+          </a:extLst>
+        </p:spPr>
+      </p:pic>
+    </p:spTree>
+    <p:extLst>
+      <p:ext uri="{BB962C8B-B14F-4D97-AF65-F5344CB8AC3E}">
+        <p14:creationId xmlns:p14="http://schemas.microsoft.com/office/powerpoint/2010/main" val="1607892895"/>
+      </p:ext>
+    </p:extLst>
+  </p:cSld>
+  <p:clrMapOvr>
+    <a:masterClrMapping/>
+  </p:clrMapOvr>
+</p:sld>
+</file>
+
+<file path=ppt/slides/slide11.xml><?xml version="1.0" encoding="utf-8"?>
+<p:sld xmlns:a="http://schemas.openxmlformats.org/drawingml/2006/main" xmlns:r="http://schemas.openxmlformats.org/officeDocument/2006/relationships" xmlns:p="http://schemas.openxmlformats.org/presentationml/2006/main">
+  <p:cSld>
+    <p:spTree>
+      <p:nvGrpSpPr>
+        <p:cNvPr id="1" name=""/>
+        <p:cNvGrpSpPr/>
+        <p:nvPr/>
+      </p:nvGrpSpPr>
+      <p:grpSpPr>
+        <a:xfrm>
+          <a:off x="0" y="0"/>
+          <a:ext cx="0" cy="0"/>
+          <a:chOff x="0" y="0"/>
+          <a:chExt cx="0" cy="0"/>
+        </a:xfrm>
+      </p:grpSpPr>
+      <p:sp>
+        <p:nvSpPr>
+          <p:cNvPr id="2" name="Titre 1">
+            <a:extLst>
+              <a:ext uri="{FF2B5EF4-FFF2-40B4-BE49-F238E27FC236}">
                 <a16:creationId xmlns:a16="http://schemas.microsoft.com/office/drawing/2014/main" id="{61EE730F-638A-4AD6-805E-26DCB391FEC3}"/>
               </a:ext>
             </a:extLst>
@@ -8795,7 +9507,7 @@
 </p:sld>
 </file>
 
-<file path=ppt/slides/slide11.xml><?xml version="1.0" encoding="utf-8"?>
+<file path=ppt/slides/slide12.xml><?xml version="1.0" encoding="utf-8"?>
 <p:sld xmlns:a="http://schemas.openxmlformats.org/drawingml/2006/main" xmlns:r="http://schemas.openxmlformats.org/officeDocument/2006/relationships" xmlns:p="http://schemas.openxmlformats.org/presentationml/2006/main">
   <p:cSld>
     <p:spTree>
@@ -14006,6 +14718,100 @@
           <p:cNvPr id="2" name="Titre 1">
             <a:extLst>
               <a:ext uri="{FF2B5EF4-FFF2-40B4-BE49-F238E27FC236}">
+                <a16:creationId xmlns:a16="http://schemas.microsoft.com/office/drawing/2014/main" id="{E1F7EF49-6C4E-4B6C-8F87-F12734767C70}"/>
+              </a:ext>
+            </a:extLst>
+          </p:cNvPr>
+          <p:cNvSpPr>
+            <a:spLocks noGrp="1"/>
+          </p:cNvSpPr>
+          <p:nvPr>
+            <p:ph type="title"/>
+          </p:nvPr>
+        </p:nvSpPr>
+        <p:spPr>
+          <a:xfrm>
+            <a:off x="656210" y="254000"/>
+            <a:ext cx="8596668" cy="1320800"/>
+          </a:xfrm>
+        </p:spPr>
+        <p:txBody>
+          <a:bodyPr/>
+          <a:lstStyle/>
+          <a:p>
+            <a:r>
+              <a:rPr lang="fr-FR" dirty="0"/>
+              <a:t>Diagramme de séquence</a:t>
+            </a:r>
+          </a:p>
+        </p:txBody>
+      </p:sp>
+      <p:pic>
+        <p:nvPicPr>
+          <p:cNvPr id="4" name="Espace réservé du contenu 3">
+            <a:extLst>
+              <a:ext uri="{FF2B5EF4-FFF2-40B4-BE49-F238E27FC236}">
+                <a16:creationId xmlns:a16="http://schemas.microsoft.com/office/drawing/2014/main" id="{629C1E8F-A911-46EA-8318-E90ABEE18363}"/>
+              </a:ext>
+            </a:extLst>
+          </p:cNvPr>
+          <p:cNvPicPr>
+            <a:picLocks noGrp="1" noChangeAspect="1"/>
+          </p:cNvPicPr>
+          <p:nvPr>
+            <p:ph idx="1"/>
+          </p:nvPr>
+        </p:nvPicPr>
+        <p:blipFill rotWithShape="1">
+          <a:blip r:embed="rId2"/>
+          <a:srcRect l="1201" r="6748" b="2314"/>
+          <a:stretch/>
+        </p:blipFill>
+        <p:spPr>
+          <a:xfrm>
+            <a:off x="656210" y="1195660"/>
+            <a:ext cx="7885624" cy="5410387"/>
+          </a:xfrm>
+          <a:prstGeom prst="rect">
+            <a:avLst/>
+          </a:prstGeom>
+        </p:spPr>
+      </p:pic>
+    </p:spTree>
+    <p:extLst>
+      <p:ext uri="{BB962C8B-B14F-4D97-AF65-F5344CB8AC3E}">
+        <p14:creationId xmlns:p14="http://schemas.microsoft.com/office/powerpoint/2010/main" val="993449588"/>
+      </p:ext>
+    </p:extLst>
+  </p:cSld>
+  <p:clrMapOvr>
+    <a:masterClrMapping/>
+  </p:clrMapOvr>
+</p:sld>
+</file>
+
+<file path=ppt/slides/slide7.xml><?xml version="1.0" encoding="utf-8"?>
+<p:sld xmlns:a="http://schemas.openxmlformats.org/drawingml/2006/main" xmlns:r="http://schemas.openxmlformats.org/officeDocument/2006/relationships" xmlns:p="http://schemas.openxmlformats.org/presentationml/2006/main">
+  <p:cSld>
+    <p:spTree>
+      <p:nvGrpSpPr>
+        <p:cNvPr id="1" name=""/>
+        <p:cNvGrpSpPr/>
+        <p:nvPr/>
+      </p:nvGrpSpPr>
+      <p:grpSpPr>
+        <a:xfrm>
+          <a:off x="0" y="0"/>
+          <a:ext cx="0" cy="0"/>
+          <a:chOff x="0" y="0"/>
+          <a:chExt cx="0" cy="0"/>
+        </a:xfrm>
+      </p:grpSpPr>
+      <p:sp>
+        <p:nvSpPr>
+          <p:cNvPr id="2" name="Titre 1">
+            <a:extLst>
+              <a:ext uri="{FF2B5EF4-FFF2-40B4-BE49-F238E27FC236}">
                 <a16:creationId xmlns:a16="http://schemas.microsoft.com/office/drawing/2014/main" id="{670F7C0E-6519-4A48-A994-BD9E492E9A93}"/>
               </a:ext>
             </a:extLst>
@@ -14074,7 +14880,7 @@
 </p:sld>
 </file>
 
-<file path=ppt/slides/slide7.xml><?xml version="1.0" encoding="utf-8"?>
+<file path=ppt/slides/slide8.xml><?xml version="1.0" encoding="utf-8"?>
 <p:sld xmlns:a="http://schemas.openxmlformats.org/drawingml/2006/main" xmlns:r="http://schemas.openxmlformats.org/officeDocument/2006/relationships" xmlns:p="http://schemas.openxmlformats.org/presentationml/2006/main">
   <p:cSld>
     <p:bg>
@@ -14983,7 +15789,7 @@
 </p:sld>
 </file>
 
-<file path=ppt/slides/slide8.xml><?xml version="1.0" encoding="utf-8"?>
+<file path=ppt/slides/slide9.xml><?xml version="1.0" encoding="utf-8"?>
 <p:sld xmlns:a="http://schemas.openxmlformats.org/drawingml/2006/main" xmlns:r="http://schemas.openxmlformats.org/officeDocument/2006/relationships" xmlns:p="http://schemas.openxmlformats.org/presentationml/2006/main">
   <p:cSld>
     <p:spTree>
@@ -15449,717 +16255,6 @@
     <p:extLst>
       <p:ext uri="{BB962C8B-B14F-4D97-AF65-F5344CB8AC3E}">
         <p14:creationId xmlns:p14="http://schemas.microsoft.com/office/powerpoint/2010/main" val="1448785139"/>
-      </p:ext>
-    </p:extLst>
-  </p:cSld>
-  <p:clrMapOvr>
-    <a:masterClrMapping/>
-  </p:clrMapOvr>
-</p:sld>
-</file>
-
-<file path=ppt/slides/slide9.xml><?xml version="1.0" encoding="utf-8"?>
-<p:sld xmlns:a="http://schemas.openxmlformats.org/drawingml/2006/main" xmlns:r="http://schemas.openxmlformats.org/officeDocument/2006/relationships" xmlns:p="http://schemas.openxmlformats.org/presentationml/2006/main">
-  <p:cSld>
-    <p:spTree>
-      <p:nvGrpSpPr>
-        <p:cNvPr id="1" name=""/>
-        <p:cNvGrpSpPr/>
-        <p:nvPr/>
-      </p:nvGrpSpPr>
-      <p:grpSpPr>
-        <a:xfrm>
-          <a:off x="0" y="0"/>
-          <a:ext cx="0" cy="0"/>
-          <a:chOff x="0" y="0"/>
-          <a:chExt cx="0" cy="0"/>
-        </a:xfrm>
-      </p:grpSpPr>
-      <p:sp>
-        <p:nvSpPr>
-          <p:cNvPr id="2" name="Titre 1">
-            <a:extLst>
-              <a:ext uri="{FF2B5EF4-FFF2-40B4-BE49-F238E27FC236}">
-                <a16:creationId xmlns:a16="http://schemas.microsoft.com/office/drawing/2014/main" id="{C08AD442-B16F-476B-9790-6E67B56D2E21}"/>
-              </a:ext>
-            </a:extLst>
-          </p:cNvPr>
-          <p:cNvSpPr>
-            <a:spLocks noGrp="1"/>
-          </p:cNvSpPr>
-          <p:nvPr>
-            <p:ph type="title"/>
-          </p:nvPr>
-        </p:nvSpPr>
-        <p:spPr>
-          <a:xfrm>
-            <a:off x="367304" y="799292"/>
-            <a:ext cx="4890164" cy="728546"/>
-          </a:xfrm>
-        </p:spPr>
-        <p:txBody>
-          <a:bodyPr>
-            <a:normAutofit fontScale="90000"/>
-          </a:bodyPr>
-          <a:lstStyle/>
-          <a:p>
-            <a:r>
-              <a:rPr lang="fr-FR" dirty="0"/>
-              <a:t>Connexion de l’afficheur </a:t>
-            </a:r>
-            <a:br>
-              <a:rPr lang="fr-FR" dirty="0"/>
-            </a:br>
-            <a:endParaRPr lang="fr-FR" dirty="0"/>
-          </a:p>
-        </p:txBody>
-      </p:sp>
-      <p:sp>
-        <p:nvSpPr>
-          <p:cNvPr id="4" name="Espace réservé du contenu 2">
-            <a:extLst>
-              <a:ext uri="{FF2B5EF4-FFF2-40B4-BE49-F238E27FC236}">
-                <a16:creationId xmlns:a16="http://schemas.microsoft.com/office/drawing/2014/main" id="{9851E94F-E7E0-4881-A550-675FD40C88F1}"/>
-              </a:ext>
-            </a:extLst>
-          </p:cNvPr>
-          <p:cNvSpPr txBox="1">
-            <a:spLocks noGrp="1"/>
-          </p:cNvSpPr>
-          <p:nvPr>
-            <p:ph idx="1"/>
-          </p:nvPr>
-        </p:nvSpPr>
-        <p:spPr>
-          <a:xfrm>
-            <a:off x="440119" y="1730820"/>
-            <a:ext cx="4890164" cy="4404804"/>
-          </a:xfrm>
-          <a:prstGeom prst="rect">
-            <a:avLst/>
-          </a:prstGeom>
-        </p:spPr>
-        <p:txBody>
-          <a:bodyPr vert="horz" lIns="91440" tIns="45720" rIns="91440" bIns="45720" rtlCol="0">
-            <a:normAutofit/>
-          </a:bodyPr>
-          <a:lstStyle>
-            <a:lvl1pPr marL="228600" indent="-228600" algn="l" defTabSz="914400" rtl="0" eaLnBrk="1" latinLnBrk="0" hangingPunct="1">
-              <a:lnSpc>
-                <a:spcPct val="90000"/>
-              </a:lnSpc>
-              <a:spcBef>
-                <a:spcPts val="1000"/>
-              </a:spcBef>
-              <a:buFont typeface="Arial" panose="020B0604020202020204" pitchFamily="34" charset="0"/>
-              <a:buChar char="•"/>
-              <a:defRPr sz="2800" kern="1200">
-                <a:solidFill>
-                  <a:schemeClr val="tx1"/>
-                </a:solidFill>
-                <a:latin typeface="+mn-lt"/>
-                <a:ea typeface="+mn-ea"/>
-                <a:cs typeface="+mn-cs"/>
-              </a:defRPr>
-            </a:lvl1pPr>
-            <a:lvl2pPr marL="685800" indent="-228600" algn="l" defTabSz="914400" rtl="0" eaLnBrk="1" latinLnBrk="0" hangingPunct="1">
-              <a:lnSpc>
-                <a:spcPct val="90000"/>
-              </a:lnSpc>
-              <a:spcBef>
-                <a:spcPts val="500"/>
-              </a:spcBef>
-              <a:buFont typeface="Arial" panose="020B0604020202020204" pitchFamily="34" charset="0"/>
-              <a:buChar char="•"/>
-              <a:defRPr sz="2400" kern="1200">
-                <a:solidFill>
-                  <a:schemeClr val="tx1"/>
-                </a:solidFill>
-                <a:latin typeface="+mn-lt"/>
-                <a:ea typeface="+mn-ea"/>
-                <a:cs typeface="+mn-cs"/>
-              </a:defRPr>
-            </a:lvl2pPr>
-            <a:lvl3pPr marL="1143000" indent="-228600" algn="l" defTabSz="914400" rtl="0" eaLnBrk="1" latinLnBrk="0" hangingPunct="1">
-              <a:lnSpc>
-                <a:spcPct val="90000"/>
-              </a:lnSpc>
-              <a:spcBef>
-                <a:spcPts val="500"/>
-              </a:spcBef>
-              <a:buFont typeface="Arial" panose="020B0604020202020204" pitchFamily="34" charset="0"/>
-              <a:buChar char="•"/>
-              <a:defRPr sz="2000" kern="1200">
-                <a:solidFill>
-                  <a:schemeClr val="tx1"/>
-                </a:solidFill>
-                <a:latin typeface="+mn-lt"/>
-                <a:ea typeface="+mn-ea"/>
-                <a:cs typeface="+mn-cs"/>
-              </a:defRPr>
-            </a:lvl3pPr>
-            <a:lvl4pPr marL="1600200" indent="-228600" algn="l" defTabSz="914400" rtl="0" eaLnBrk="1" latinLnBrk="0" hangingPunct="1">
-              <a:lnSpc>
-                <a:spcPct val="90000"/>
-              </a:lnSpc>
-              <a:spcBef>
-                <a:spcPts val="500"/>
-              </a:spcBef>
-              <a:buFont typeface="Arial" panose="020B0604020202020204" pitchFamily="34" charset="0"/>
-              <a:buChar char="•"/>
-              <a:defRPr sz="1800" kern="1200">
-                <a:solidFill>
-                  <a:schemeClr val="tx1"/>
-                </a:solidFill>
-                <a:latin typeface="+mn-lt"/>
-                <a:ea typeface="+mn-ea"/>
-                <a:cs typeface="+mn-cs"/>
-              </a:defRPr>
-            </a:lvl4pPr>
-            <a:lvl5pPr marL="2057400" indent="-228600" algn="l" defTabSz="914400" rtl="0" eaLnBrk="1" latinLnBrk="0" hangingPunct="1">
-              <a:lnSpc>
-                <a:spcPct val="90000"/>
-              </a:lnSpc>
-              <a:spcBef>
-                <a:spcPts val="500"/>
-              </a:spcBef>
-              <a:buFont typeface="Arial" panose="020B0604020202020204" pitchFamily="34" charset="0"/>
-              <a:buChar char="•"/>
-              <a:defRPr sz="1800" kern="1200">
-                <a:solidFill>
-                  <a:schemeClr val="tx1"/>
-                </a:solidFill>
-                <a:latin typeface="+mn-lt"/>
-                <a:ea typeface="+mn-ea"/>
-                <a:cs typeface="+mn-cs"/>
-              </a:defRPr>
-            </a:lvl5pPr>
-            <a:lvl6pPr marL="2514600" indent="-228600" algn="l" defTabSz="914400" rtl="0" eaLnBrk="1" latinLnBrk="0" hangingPunct="1">
-              <a:lnSpc>
-                <a:spcPct val="90000"/>
-              </a:lnSpc>
-              <a:spcBef>
-                <a:spcPts val="500"/>
-              </a:spcBef>
-              <a:buFont typeface="Arial" panose="020B0604020202020204" pitchFamily="34" charset="0"/>
-              <a:buChar char="•"/>
-              <a:defRPr sz="1800" kern="1200">
-                <a:solidFill>
-                  <a:schemeClr val="tx1"/>
-                </a:solidFill>
-                <a:latin typeface="+mn-lt"/>
-                <a:ea typeface="+mn-ea"/>
-                <a:cs typeface="+mn-cs"/>
-              </a:defRPr>
-            </a:lvl6pPr>
-            <a:lvl7pPr marL="2971800" indent="-228600" algn="l" defTabSz="914400" rtl="0" eaLnBrk="1" latinLnBrk="0" hangingPunct="1">
-              <a:lnSpc>
-                <a:spcPct val="90000"/>
-              </a:lnSpc>
-              <a:spcBef>
-                <a:spcPts val="500"/>
-              </a:spcBef>
-              <a:buFont typeface="Arial" panose="020B0604020202020204" pitchFamily="34" charset="0"/>
-              <a:buChar char="•"/>
-              <a:defRPr sz="1800" kern="1200">
-                <a:solidFill>
-                  <a:schemeClr val="tx1"/>
-                </a:solidFill>
-                <a:latin typeface="+mn-lt"/>
-                <a:ea typeface="+mn-ea"/>
-                <a:cs typeface="+mn-cs"/>
-              </a:defRPr>
-            </a:lvl7pPr>
-            <a:lvl8pPr marL="3429000" indent="-228600" algn="l" defTabSz="914400" rtl="0" eaLnBrk="1" latinLnBrk="0" hangingPunct="1">
-              <a:lnSpc>
-                <a:spcPct val="90000"/>
-              </a:lnSpc>
-              <a:spcBef>
-                <a:spcPts val="500"/>
-              </a:spcBef>
-              <a:buFont typeface="Arial" panose="020B0604020202020204" pitchFamily="34" charset="0"/>
-              <a:buChar char="•"/>
-              <a:defRPr sz="1800" kern="1200">
-                <a:solidFill>
-                  <a:schemeClr val="tx1"/>
-                </a:solidFill>
-                <a:latin typeface="+mn-lt"/>
-                <a:ea typeface="+mn-ea"/>
-                <a:cs typeface="+mn-cs"/>
-              </a:defRPr>
-            </a:lvl8pPr>
-            <a:lvl9pPr marL="3886200" indent="-228600" algn="l" defTabSz="914400" rtl="0" eaLnBrk="1" latinLnBrk="0" hangingPunct="1">
-              <a:lnSpc>
-                <a:spcPct val="90000"/>
-              </a:lnSpc>
-              <a:spcBef>
-                <a:spcPts val="500"/>
-              </a:spcBef>
-              <a:buFont typeface="Arial" panose="020B0604020202020204" pitchFamily="34" charset="0"/>
-              <a:buChar char="•"/>
-              <a:defRPr sz="1800" kern="1200">
-                <a:solidFill>
-                  <a:schemeClr val="tx1"/>
-                </a:solidFill>
-                <a:latin typeface="+mn-lt"/>
-                <a:ea typeface="+mn-ea"/>
-                <a:cs typeface="+mn-cs"/>
-              </a:defRPr>
-            </a:lvl9pPr>
-          </a:lstStyle>
-          <a:p>
-            <a:pPr>
-              <a:buClr>
-                <a:schemeClr val="accent4"/>
-              </a:buClr>
-              <a:buFont typeface="Wingdings" panose="05000000000000000000" pitchFamily="2" charset="2"/>
-              <a:buChar char="Ø"/>
-            </a:pPr>
-            <a:r>
-              <a:rPr lang="fr-FR" sz="1800" dirty="0"/>
-              <a:t>Connecter Ecran LCD</a:t>
-            </a:r>
-          </a:p>
-          <a:p>
-            <a:endParaRPr lang="fr-FR" dirty="0"/>
-          </a:p>
-          <a:p>
-            <a:endParaRPr lang="fr-FR" dirty="0"/>
-          </a:p>
-          <a:p>
-            <a:endParaRPr lang="fr-FR" dirty="0"/>
-          </a:p>
-          <a:p>
-            <a:endParaRPr lang="fr-FR" dirty="0"/>
-          </a:p>
-          <a:p>
-            <a:endParaRPr lang="fr-FR" dirty="0"/>
-          </a:p>
-          <a:p>
-            <a:pPr marL="0" indent="0">
-              <a:buNone/>
-            </a:pPr>
-            <a:endParaRPr lang="fr-FR" dirty="0"/>
-          </a:p>
-          <a:p>
-            <a:pPr>
-              <a:buClr>
-                <a:schemeClr val="accent4"/>
-              </a:buClr>
-              <a:buFont typeface="Wingdings" panose="05000000000000000000" pitchFamily="2" charset="2"/>
-              <a:buChar char="Ø"/>
-            </a:pPr>
-            <a:r>
-              <a:rPr lang="fr-FR" sz="1800" dirty="0"/>
-              <a:t>Affichage de l’énigme sur l’</a:t>
-            </a:r>
-            <a:r>
-              <a:rPr lang="fr-FR" sz="1800" dirty="0" err="1"/>
-              <a:t>ecran</a:t>
-            </a:r>
-            <a:r>
-              <a:rPr lang="fr-FR" sz="1800" dirty="0"/>
-              <a:t> quand le code est bon</a:t>
-            </a:r>
-          </a:p>
-          <a:p>
-            <a:endParaRPr lang="fr-FR" dirty="0"/>
-          </a:p>
-        </p:txBody>
-      </p:sp>
-      <p:sp>
-        <p:nvSpPr>
-          <p:cNvPr id="5" name="Espace réservé du contenu 2">
-            <a:extLst>
-              <a:ext uri="{FF2B5EF4-FFF2-40B4-BE49-F238E27FC236}">
-                <a16:creationId xmlns:a16="http://schemas.microsoft.com/office/drawing/2014/main" id="{4EA4B949-06FA-4096-83AB-E011A5F55242}"/>
-              </a:ext>
-            </a:extLst>
-          </p:cNvPr>
-          <p:cNvSpPr txBox="1">
-            <a:spLocks/>
-          </p:cNvSpPr>
-          <p:nvPr/>
-        </p:nvSpPr>
-        <p:spPr>
-          <a:xfrm>
-            <a:off x="5499627" y="1703834"/>
-            <a:ext cx="5257800" cy="4351338"/>
-          </a:xfrm>
-          <a:prstGeom prst="rect">
-            <a:avLst/>
-          </a:prstGeom>
-        </p:spPr>
-        <p:txBody>
-          <a:bodyPr vert="horz" lIns="91440" tIns="45720" rIns="91440" bIns="45720" rtlCol="0">
-            <a:normAutofit/>
-          </a:bodyPr>
-          <a:lstStyle>
-            <a:lvl1pPr marL="342900" indent="-342900" algn="l" defTabSz="457200" rtl="0" eaLnBrk="1" latinLnBrk="0" hangingPunct="1">
-              <a:spcBef>
-                <a:spcPts val="1000"/>
-              </a:spcBef>
-              <a:spcAft>
-                <a:spcPts val="0"/>
-              </a:spcAft>
-              <a:buClr>
-                <a:schemeClr val="accent1"/>
-              </a:buClr>
-              <a:buSzPct val="80000"/>
-              <a:buFont typeface="Wingdings 3" charset="2"/>
-              <a:buChar char=""/>
-              <a:defRPr sz="1800" kern="1200">
-                <a:solidFill>
-                  <a:schemeClr val="tx1">
-                    <a:lumMod val="75000"/>
-                    <a:lumOff val="25000"/>
-                  </a:schemeClr>
-                </a:solidFill>
-                <a:latin typeface="+mn-lt"/>
-                <a:ea typeface="+mn-ea"/>
-                <a:cs typeface="+mn-cs"/>
-              </a:defRPr>
-            </a:lvl1pPr>
-            <a:lvl2pPr marL="742950" indent="-285750" algn="l" defTabSz="457200" rtl="0" eaLnBrk="1" latinLnBrk="0" hangingPunct="1">
-              <a:spcBef>
-                <a:spcPts val="1000"/>
-              </a:spcBef>
-              <a:spcAft>
-                <a:spcPts val="0"/>
-              </a:spcAft>
-              <a:buClr>
-                <a:schemeClr val="accent1"/>
-              </a:buClr>
-              <a:buSzPct val="80000"/>
-              <a:buFont typeface="Wingdings 3" charset="2"/>
-              <a:buChar char=""/>
-              <a:defRPr sz="1600" kern="1200">
-                <a:solidFill>
-                  <a:schemeClr val="tx1">
-                    <a:lumMod val="75000"/>
-                    <a:lumOff val="25000"/>
-                  </a:schemeClr>
-                </a:solidFill>
-                <a:latin typeface="+mn-lt"/>
-                <a:ea typeface="+mn-ea"/>
-                <a:cs typeface="+mn-cs"/>
-              </a:defRPr>
-            </a:lvl2pPr>
-            <a:lvl3pPr marL="1143000" indent="-228600" algn="l" defTabSz="457200" rtl="0" eaLnBrk="1" latinLnBrk="0" hangingPunct="1">
-              <a:spcBef>
-                <a:spcPts val="1000"/>
-              </a:spcBef>
-              <a:spcAft>
-                <a:spcPts val="0"/>
-              </a:spcAft>
-              <a:buClr>
-                <a:schemeClr val="accent1"/>
-              </a:buClr>
-              <a:buSzPct val="80000"/>
-              <a:buFont typeface="Wingdings 3" charset="2"/>
-              <a:buChar char=""/>
-              <a:defRPr sz="1400" kern="1200">
-                <a:solidFill>
-                  <a:schemeClr val="tx1">
-                    <a:lumMod val="75000"/>
-                    <a:lumOff val="25000"/>
-                  </a:schemeClr>
-                </a:solidFill>
-                <a:latin typeface="+mn-lt"/>
-                <a:ea typeface="+mn-ea"/>
-                <a:cs typeface="+mn-cs"/>
-              </a:defRPr>
-            </a:lvl3pPr>
-            <a:lvl4pPr marL="1600200" indent="-228600" algn="l" defTabSz="457200" rtl="0" eaLnBrk="1" latinLnBrk="0" hangingPunct="1">
-              <a:spcBef>
-                <a:spcPts val="1000"/>
-              </a:spcBef>
-              <a:spcAft>
-                <a:spcPts val="0"/>
-              </a:spcAft>
-              <a:buClr>
-                <a:schemeClr val="accent1"/>
-              </a:buClr>
-              <a:buSzPct val="80000"/>
-              <a:buFont typeface="Wingdings 3" charset="2"/>
-              <a:buChar char=""/>
-              <a:defRPr sz="1200" kern="1200">
-                <a:solidFill>
-                  <a:schemeClr val="tx1">
-                    <a:lumMod val="75000"/>
-                    <a:lumOff val="25000"/>
-                  </a:schemeClr>
-                </a:solidFill>
-                <a:latin typeface="+mn-lt"/>
-                <a:ea typeface="+mn-ea"/>
-                <a:cs typeface="+mn-cs"/>
-              </a:defRPr>
-            </a:lvl4pPr>
-            <a:lvl5pPr marL="2057400" indent="-228600" algn="l" defTabSz="457200" rtl="0" eaLnBrk="1" latinLnBrk="0" hangingPunct="1">
-              <a:spcBef>
-                <a:spcPts val="1000"/>
-              </a:spcBef>
-              <a:spcAft>
-                <a:spcPts val="0"/>
-              </a:spcAft>
-              <a:buClr>
-                <a:schemeClr val="accent1"/>
-              </a:buClr>
-              <a:buSzPct val="80000"/>
-              <a:buFont typeface="Wingdings 3" charset="2"/>
-              <a:buChar char=""/>
-              <a:defRPr sz="1200" kern="1200">
-                <a:solidFill>
-                  <a:schemeClr val="tx1">
-                    <a:lumMod val="75000"/>
-                    <a:lumOff val="25000"/>
-                  </a:schemeClr>
-                </a:solidFill>
-                <a:latin typeface="+mn-lt"/>
-                <a:ea typeface="+mn-ea"/>
-                <a:cs typeface="+mn-cs"/>
-              </a:defRPr>
-            </a:lvl5pPr>
-            <a:lvl6pPr marL="2514600" indent="-228600" algn="l" defTabSz="457200" rtl="0" eaLnBrk="1" latinLnBrk="0" hangingPunct="1">
-              <a:spcBef>
-                <a:spcPts val="1000"/>
-              </a:spcBef>
-              <a:spcAft>
-                <a:spcPts val="0"/>
-              </a:spcAft>
-              <a:buClr>
-                <a:schemeClr val="accent1"/>
-              </a:buClr>
-              <a:buSzPct val="80000"/>
-              <a:buFont typeface="Wingdings 3" charset="2"/>
-              <a:buChar char=""/>
-              <a:defRPr sz="1200" kern="1200">
-                <a:solidFill>
-                  <a:schemeClr val="tx1">
-                    <a:lumMod val="75000"/>
-                    <a:lumOff val="25000"/>
-                  </a:schemeClr>
-                </a:solidFill>
-                <a:latin typeface="+mn-lt"/>
-                <a:ea typeface="+mn-ea"/>
-                <a:cs typeface="+mn-cs"/>
-              </a:defRPr>
-            </a:lvl6pPr>
-            <a:lvl7pPr marL="2971800" indent="-228600" algn="l" defTabSz="457200" rtl="0" eaLnBrk="1" latinLnBrk="0" hangingPunct="1">
-              <a:spcBef>
-                <a:spcPts val="1000"/>
-              </a:spcBef>
-              <a:spcAft>
-                <a:spcPts val="0"/>
-              </a:spcAft>
-              <a:buClr>
-                <a:schemeClr val="accent1"/>
-              </a:buClr>
-              <a:buSzPct val="80000"/>
-              <a:buFont typeface="Wingdings 3" charset="2"/>
-              <a:buChar char=""/>
-              <a:defRPr sz="1200" kern="1200">
-                <a:solidFill>
-                  <a:schemeClr val="tx1">
-                    <a:lumMod val="75000"/>
-                    <a:lumOff val="25000"/>
-                  </a:schemeClr>
-                </a:solidFill>
-                <a:latin typeface="+mn-lt"/>
-                <a:ea typeface="+mn-ea"/>
-                <a:cs typeface="+mn-cs"/>
-              </a:defRPr>
-            </a:lvl7pPr>
-            <a:lvl8pPr marL="3429000" indent="-228600" algn="l" defTabSz="457200" rtl="0" eaLnBrk="1" latinLnBrk="0" hangingPunct="1">
-              <a:spcBef>
-                <a:spcPts val="1000"/>
-              </a:spcBef>
-              <a:spcAft>
-                <a:spcPts val="0"/>
-              </a:spcAft>
-              <a:buClr>
-                <a:schemeClr val="accent1"/>
-              </a:buClr>
-              <a:buSzPct val="80000"/>
-              <a:buFont typeface="Wingdings 3" charset="2"/>
-              <a:buChar char=""/>
-              <a:defRPr sz="1200" kern="1200">
-                <a:solidFill>
-                  <a:schemeClr val="tx1">
-                    <a:lumMod val="75000"/>
-                    <a:lumOff val="25000"/>
-                  </a:schemeClr>
-                </a:solidFill>
-                <a:latin typeface="+mn-lt"/>
-                <a:ea typeface="+mn-ea"/>
-                <a:cs typeface="+mn-cs"/>
-              </a:defRPr>
-            </a:lvl8pPr>
-            <a:lvl9pPr marL="3886200" indent="-228600" algn="l" defTabSz="457200" rtl="0" eaLnBrk="1" latinLnBrk="0" hangingPunct="1">
-              <a:spcBef>
-                <a:spcPts val="1000"/>
-              </a:spcBef>
-              <a:spcAft>
-                <a:spcPts val="0"/>
-              </a:spcAft>
-              <a:buClr>
-                <a:schemeClr val="accent1"/>
-              </a:buClr>
-              <a:buSzPct val="80000"/>
-              <a:buFont typeface="Wingdings 3" charset="2"/>
-              <a:buChar char=""/>
-              <a:defRPr sz="1200" kern="1200">
-                <a:solidFill>
-                  <a:schemeClr val="tx1">
-                    <a:lumMod val="75000"/>
-                    <a:lumOff val="25000"/>
-                  </a:schemeClr>
-                </a:solidFill>
-                <a:latin typeface="+mn-lt"/>
-                <a:ea typeface="+mn-ea"/>
-                <a:cs typeface="+mn-cs"/>
-              </a:defRPr>
-            </a:lvl9pPr>
-          </a:lstStyle>
-          <a:p>
-            <a:pPr>
-              <a:buClr>
-                <a:schemeClr val="accent4"/>
-              </a:buClr>
-              <a:buFont typeface="Wingdings" panose="05000000000000000000" pitchFamily="2" charset="2"/>
-              <a:buChar char="Ø"/>
-            </a:pPr>
-            <a:r>
-              <a:rPr lang="fr-FR" dirty="0"/>
-              <a:t>Code de connexion avec librairie "</a:t>
-            </a:r>
-            <a:r>
-              <a:rPr lang="fr-FR" dirty="0" err="1"/>
-              <a:t>LiquidCrystal.h</a:t>
-            </a:r>
-            <a:r>
-              <a:rPr lang="fr-FR" dirty="0"/>
-              <a:t>"  </a:t>
-            </a:r>
-          </a:p>
-          <a:p>
-            <a:endParaRPr lang="fr-FR" dirty="0"/>
-          </a:p>
-        </p:txBody>
-      </p:sp>
-      <p:pic>
-        <p:nvPicPr>
-          <p:cNvPr id="6" name="Image 5">
-            <a:extLst>
-              <a:ext uri="{FF2B5EF4-FFF2-40B4-BE49-F238E27FC236}">
-                <a16:creationId xmlns:a16="http://schemas.microsoft.com/office/drawing/2014/main" id="{347D77F9-F00E-4AF1-BE02-1057BAD09A07}"/>
-              </a:ext>
-            </a:extLst>
-          </p:cNvPr>
-          <p:cNvPicPr>
-            <a:picLocks noChangeAspect="1"/>
-          </p:cNvPicPr>
-          <p:nvPr/>
-        </p:nvPicPr>
-        <p:blipFill>
-          <a:blip r:embed="rId2"/>
-          <a:stretch>
-            <a:fillRect/>
-          </a:stretch>
-        </p:blipFill>
-        <p:spPr>
-          <a:xfrm>
-            <a:off x="5226968" y="2568147"/>
-            <a:ext cx="4401664" cy="2461053"/>
-          </a:xfrm>
-          <a:prstGeom prst="rect">
-            <a:avLst/>
-          </a:prstGeom>
-        </p:spPr>
-      </p:pic>
-      <p:pic>
-        <p:nvPicPr>
-          <p:cNvPr id="7" name="Image 6">
-            <a:extLst>
-              <a:ext uri="{FF2B5EF4-FFF2-40B4-BE49-F238E27FC236}">
-                <a16:creationId xmlns:a16="http://schemas.microsoft.com/office/drawing/2014/main" id="{1459C5C6-CB41-4C0D-8DFB-05145DEC6DD6}"/>
-              </a:ext>
-            </a:extLst>
-          </p:cNvPr>
-          <p:cNvPicPr/>
-          <p:nvPr/>
-        </p:nvPicPr>
-        <p:blipFill>
-          <a:blip r:embed="rId3">
-            <a:extLst>
-              <a:ext uri="{28A0092B-C50C-407E-A947-70E740481C1C}">
-                <a14:useLocalDpi xmlns:a14="http://schemas.microsoft.com/office/drawing/2010/main" val="0"/>
-              </a:ext>
-            </a:extLst>
-          </a:blip>
-          <a:stretch>
-            <a:fillRect/>
-          </a:stretch>
-        </p:blipFill>
-        <p:spPr>
-          <a:xfrm>
-            <a:off x="392430" y="2235169"/>
-            <a:ext cx="4133850" cy="2186940"/>
-          </a:xfrm>
-          <a:prstGeom prst="rect">
-            <a:avLst/>
-          </a:prstGeom>
-        </p:spPr>
-      </p:pic>
-      <p:pic>
-        <p:nvPicPr>
-          <p:cNvPr id="8" name="Picture 2" descr="Image associée">
-            <a:extLst>
-              <a:ext uri="{FF2B5EF4-FFF2-40B4-BE49-F238E27FC236}">
-                <a16:creationId xmlns:a16="http://schemas.microsoft.com/office/drawing/2014/main" id="{1D2A2ED6-3334-446B-B7F9-4AEDA8226A7B}"/>
-              </a:ext>
-            </a:extLst>
-          </p:cNvPr>
-          <p:cNvPicPr>
-            <a:picLocks noChangeAspect="1" noChangeArrowheads="1"/>
-          </p:cNvPicPr>
-          <p:nvPr/>
-        </p:nvPicPr>
-        <p:blipFill rotWithShape="1">
-          <a:blip r:embed="rId4">
-            <a:extLst>
-              <a:ext uri="{28A0092B-C50C-407E-A947-70E740481C1C}">
-                <a14:useLocalDpi xmlns:a14="http://schemas.microsoft.com/office/drawing/2010/main" val="0"/>
-              </a:ext>
-            </a:extLst>
-          </a:blip>
-          <a:srcRect l="18677" r="15441"/>
-          <a:stretch/>
-        </p:blipFill>
-        <p:spPr bwMode="auto">
-          <a:xfrm>
-            <a:off x="143436" y="143435"/>
-            <a:ext cx="2269635" cy="609600"/>
-          </a:xfrm>
-          <a:prstGeom prst="rect">
-            <a:avLst/>
-          </a:prstGeom>
-          <a:noFill/>
-          <a:extLst>
-            <a:ext uri="{909E8E84-426E-40DD-AFC4-6F175D3DCCD1}">
-              <a14:hiddenFill xmlns:a14="http://schemas.microsoft.com/office/drawing/2010/main">
-                <a:solidFill>
-                  <a:srgbClr val="FFFFFF"/>
-                </a:solidFill>
-              </a14:hiddenFill>
-            </a:ext>
-          </a:extLst>
-        </p:spPr>
-      </p:pic>
-    </p:spTree>
-    <p:extLst>
-      <p:ext uri="{BB962C8B-B14F-4D97-AF65-F5344CB8AC3E}">
-        <p14:creationId xmlns:p14="http://schemas.microsoft.com/office/powerpoint/2010/main" val="1607892895"/>
       </p:ext>
     </p:extLst>
   </p:cSld>

</xml_diff>